<commit_message>
the document of directory structure is updated.
</commit_message>
<xml_diff>
--- a/doc/project_setting__directory_structure.pptx
+++ b/doc/project_setting__directory_structure.pptx
@@ -235,7 +235,7 @@
             <a:fld id="{7A1B90C6-478F-4020-94F7-7A365D69A3A0}" type="datetimeFigureOut">
               <a:rPr lang="ko-KR" altLang="en-US" smtClean="0"/>
               <a:pPr/>
-              <a:t>2009-08-05</a:t>
+              <a:t>2009-10-29</a:t>
             </a:fld>
             <a:endParaRPr lang="ko-KR" altLang="en-US"/>
           </a:p>
@@ -397,7 +397,7 @@
             <a:fld id="{B21C34AF-9FD1-4FB2-A2EC-FD937BF46C9F}" type="datetimeFigureOut">
               <a:rPr lang="ko-KR" altLang="en-US" smtClean="0"/>
               <a:pPr/>
-              <a:t>2009-08-05</a:t>
+              <a:t>2009-10-29</a:t>
             </a:fld>
             <a:endParaRPr lang="ko-KR" altLang="en-US"/>
           </a:p>
@@ -5378,13 +5378,7 @@
               <a:rPr lang="en-US" altLang="ko-KR" sz="4400" dirty="0" smtClean="0">
                 <a:ea typeface="굴림" pitchFamily="50" charset="-127"/>
               </a:rPr>
-              <a:t>Project </a:t>
-            </a:r>
-            <a:r>
-              <a:rPr lang="en-US" altLang="ko-KR" sz="4400" dirty="0" smtClean="0">
-                <a:ea typeface="굴림" pitchFamily="50" charset="-127"/>
-              </a:rPr>
-              <a:t>Setting</a:t>
+              <a:t>Project Setting</a:t>
             </a:r>
             <a:endParaRPr lang="en-US" altLang="ko-KR" sz="4400" dirty="0">
               <a:ea typeface="굴림" pitchFamily="50" charset="-127"/>
@@ -6518,7 +6512,7 @@
             <a:pPr lvl="2"/>
             <a:r>
               <a:rPr lang="en-US" altLang="ko-KR" dirty="0" smtClean="0"/>
-              <a:t>amigo.sln</a:t>
+              <a:t>cpp_swl_msvc80.sln / cpp_swl_msvc90.sln</a:t>
             </a:r>
             <a:endParaRPr lang="ko-KR" altLang="en-US" dirty="0" smtClean="0"/>
           </a:p>
@@ -6726,9 +6720,8 @@
             <a:pPr lvl="3"/>
             <a:r>
               <a:rPr lang="en-US" altLang="ko-KR" dirty="0" smtClean="0"/>
-              <a:t>amigo.dox</a:t>
-            </a:r>
-            <a:endParaRPr lang="en-US" altLang="ko-KR" dirty="0" smtClean="0"/>
+              <a:t>swl.dox</a:t>
+            </a:r>
           </a:p>
           <a:p>
             <a:pPr lvl="2"/>
@@ -6878,12 +6871,20 @@
               <a:t>하에 </a:t>
             </a:r>
             <a:r>
+              <a:rPr lang="en-US" altLang="ko-KR" dirty="0" smtClean="0"/>
+              <a:t>‘</a:t>
+            </a:r>
+            <a:r>
               <a:rPr lang="en-US" altLang="ko-KR" dirty="0" err="1" smtClean="0"/>
               <a:t>swl</a:t>
             </a:r>
             <a:r>
               <a:rPr lang="en-US" altLang="ko-KR" dirty="0" smtClean="0"/>
-              <a:t> sub-directory</a:t>
+              <a:t>’ </a:t>
+            </a:r>
+            <a:r>
+              <a:rPr lang="en-US" altLang="ko-KR" dirty="0" smtClean="0"/>
+              <a:t>sub-directory</a:t>
             </a:r>
             <a:r>
               <a:rPr lang="ko-KR" altLang="en-US" dirty="0" smtClean="0"/>
@@ -6939,11 +6940,7 @@
             </a:r>
             <a:r>
               <a:rPr lang="en-US" altLang="ko-KR" dirty="0" smtClean="0"/>
-              <a:t>) ‘</a:t>
-            </a:r>
-            <a:r>
-              <a:rPr lang="en-US" altLang="ko-KR" dirty="0" smtClean="0"/>
-              <a:t>inc/</a:t>
+              <a:t>) ‘inc/</a:t>
             </a:r>
             <a:r>
               <a:rPr lang="en-US" altLang="ko-KR" dirty="0" err="1" smtClean="0"/>
@@ -6953,45 +6950,44 @@
               <a:rPr lang="en-US" altLang="ko-KR" dirty="0" smtClean="0"/>
               <a:t>/base’</a:t>
             </a:r>
+          </a:p>
+          <a:p>
+            <a:pPr lvl="1"/>
+            <a:r>
+              <a:rPr lang="en-US" altLang="ko-KR" dirty="0" smtClean="0"/>
+              <a:t>SWL project</a:t>
+            </a:r>
+            <a:r>
+              <a:rPr lang="ko-KR" altLang="en-US" dirty="0" smtClean="0"/>
+              <a:t>의 </a:t>
+            </a:r>
+            <a:r>
+              <a:rPr lang="en-US" altLang="ko-KR" dirty="0" smtClean="0"/>
+              <a:t>DLL/LIB </a:t>
+            </a:r>
+            <a:r>
+              <a:rPr lang="ko-KR" altLang="en-US" dirty="0" smtClean="0"/>
+              <a:t>사용하는</a:t>
+            </a:r>
+            <a:r>
+              <a:rPr lang="en-US" altLang="ko-KR" dirty="0" smtClean="0"/>
+              <a:t> </a:t>
+            </a:r>
+            <a:r>
+              <a:rPr lang="ko-KR" altLang="en-US" dirty="0" smtClean="0"/>
+              <a:t>경우</a:t>
+            </a:r>
+            <a:r>
+              <a:rPr lang="en-US" altLang="ko-KR" dirty="0" smtClean="0"/>
+              <a:t>, header file</a:t>
+            </a:r>
+            <a:r>
+              <a:rPr lang="ko-KR" altLang="en-US" dirty="0" smtClean="0"/>
+              <a:t>을 아래와 같이 포함시킴</a:t>
+            </a:r>
             <a:endParaRPr lang="en-US" altLang="ko-KR" dirty="0" smtClean="0"/>
           </a:p>
           <a:p>
-            <a:pPr lvl="1"/>
-            <a:r>
-              <a:rPr lang="en-US" altLang="ko-KR" dirty="0" smtClean="0"/>
-              <a:t>SWL project</a:t>
-            </a:r>
-            <a:r>
-              <a:rPr lang="ko-KR" altLang="en-US" dirty="0" smtClean="0"/>
-              <a:t>의 </a:t>
-            </a:r>
-            <a:r>
-              <a:rPr lang="en-US" altLang="ko-KR" dirty="0" smtClean="0"/>
-              <a:t>DLL/LIB </a:t>
-            </a:r>
-            <a:r>
-              <a:rPr lang="ko-KR" altLang="en-US" dirty="0" smtClean="0"/>
-              <a:t>사용하는</a:t>
-            </a:r>
-            <a:r>
-              <a:rPr lang="en-US" altLang="ko-KR" dirty="0" smtClean="0"/>
-              <a:t> </a:t>
-            </a:r>
-            <a:r>
-              <a:rPr lang="ko-KR" altLang="en-US" dirty="0" smtClean="0"/>
-              <a:t>경우</a:t>
-            </a:r>
-            <a:r>
-              <a:rPr lang="en-US" altLang="ko-KR" dirty="0" smtClean="0"/>
-              <a:t>, header file</a:t>
-            </a:r>
-            <a:r>
-              <a:rPr lang="ko-KR" altLang="en-US" dirty="0" smtClean="0"/>
-              <a:t>을 아래와 같이 포함시킴</a:t>
-            </a:r>
-            <a:endParaRPr lang="en-US" altLang="ko-KR" dirty="0" smtClean="0"/>
-          </a:p>
-          <a:p>
             <a:pPr lvl="2"/>
             <a:r>
               <a:rPr lang="ko-KR" altLang="en-US" dirty="0" smtClean="0"/>
@@ -6999,11 +6995,7 @@
             </a:r>
             <a:r>
               <a:rPr lang="en-US" altLang="ko-KR" dirty="0" smtClean="0"/>
-              <a:t>) #include </a:t>
-            </a:r>
-            <a:r>
-              <a:rPr lang="en-US" altLang="ko-KR" dirty="0" smtClean="0"/>
-              <a:t>“</a:t>
+              <a:t>) #include “</a:t>
             </a:r>
             <a:r>
               <a:rPr lang="en-US" altLang="ko-KR" dirty="0" err="1" smtClean="0"/>
@@ -7085,7 +7077,7 @@
         <p:spPr/>
         <p:txBody>
           <a:bodyPr>
-            <a:normAutofit fontScale="92500" lnSpcReduction="10000"/>
+            <a:normAutofit fontScale="85000" lnSpcReduction="20000"/>
           </a:bodyPr>
           <a:lstStyle/>
           <a:p>
@@ -7254,17 +7246,113 @@
               <a:t>와 관계된 </a:t>
             </a:r>
             <a:r>
-              <a:rPr lang="en-US" altLang="ko-KR" dirty="0" smtClean="0"/>
-              <a:t>DLL &amp; LIB project</a:t>
-            </a:r>
-            <a:r>
-              <a:rPr lang="ko-KR" altLang="en-US" dirty="0" smtClean="0"/>
-              <a:t>들이 위치하는 </a:t>
+              <a:rPr lang="ko-KR" altLang="en-US" dirty="0" smtClean="0"/>
+              <a:t>주요 </a:t>
+            </a:r>
+            <a:r>
+              <a:rPr lang="en-US" altLang="ko-KR" dirty="0" smtClean="0"/>
+              <a:t>source code</a:t>
+            </a:r>
+            <a:r>
+              <a:rPr lang="ko-KR" altLang="en-US" dirty="0" smtClean="0"/>
+              <a:t>가 위치한 </a:t>
             </a:r>
             <a:r>
               <a:rPr lang="en-US" altLang="ko-KR" dirty="0" smtClean="0"/>
               <a:t>directory</a:t>
             </a:r>
+          </a:p>
+          <a:p>
+            <a:pPr lvl="1"/>
+            <a:r>
+              <a:rPr lang="en-US" altLang="ko-KR" dirty="0" smtClean="0"/>
+              <a:t>‘</a:t>
+            </a:r>
+            <a:r>
+              <a:rPr lang="en-US" altLang="ko-KR" dirty="0" err="1" smtClean="0"/>
+              <a:t>src</a:t>
+            </a:r>
+            <a:r>
+              <a:rPr lang="en-US" altLang="ko-KR" dirty="0" smtClean="0"/>
+              <a:t>’ directory </a:t>
+            </a:r>
+            <a:r>
+              <a:rPr lang="ko-KR" altLang="en-US" dirty="0" smtClean="0"/>
+              <a:t>하에 </a:t>
+            </a:r>
+            <a:r>
+              <a:rPr lang="en-US" altLang="ko-KR" dirty="0" smtClean="0"/>
+              <a:t>(</a:t>
+            </a:r>
+            <a:r>
+              <a:rPr lang="ko-KR" altLang="en-US" dirty="0" smtClean="0"/>
+              <a:t>주로</a:t>
+            </a:r>
+            <a:r>
+              <a:rPr lang="en-US" altLang="ko-KR" dirty="0" smtClean="0"/>
+              <a:t>) </a:t>
+            </a:r>
+            <a:r>
+              <a:rPr lang="en-US" altLang="ko-KR" dirty="0" smtClean="0"/>
+              <a:t>DLL </a:t>
+            </a:r>
+            <a:r>
+              <a:rPr lang="en-US" altLang="ko-KR" dirty="0" smtClean="0"/>
+              <a:t>&amp; </a:t>
+            </a:r>
+            <a:r>
+              <a:rPr lang="en-US" altLang="ko-KR" dirty="0" smtClean="0"/>
+              <a:t>LIB</a:t>
+            </a:r>
+            <a:r>
+              <a:rPr lang="ko-KR" altLang="en-US" dirty="0" smtClean="0"/>
+              <a:t>을 생성하기 위한</a:t>
+            </a:r>
+            <a:r>
+              <a:rPr lang="en-US" altLang="ko-KR" dirty="0" smtClean="0"/>
+              <a:t> </a:t>
+            </a:r>
+            <a:r>
+              <a:rPr lang="en-US" altLang="ko-KR" dirty="0" smtClean="0"/>
+              <a:t>project</a:t>
+            </a:r>
+            <a:r>
+              <a:rPr lang="ko-KR" altLang="en-US" dirty="0" smtClean="0"/>
+              <a:t>들이 위치하게 되며 이들 </a:t>
+            </a:r>
+            <a:r>
+              <a:rPr lang="en-US" altLang="ko-KR" dirty="0" smtClean="0"/>
+              <a:t>project </a:t>
+            </a:r>
+            <a:r>
+              <a:rPr lang="ko-KR" altLang="en-US" dirty="0" smtClean="0"/>
+              <a:t>결과물을 </a:t>
+            </a:r>
+            <a:r>
+              <a:rPr lang="en-US" altLang="ko-KR" dirty="0" smtClean="0"/>
+              <a:t>‘app’ </a:t>
+            </a:r>
+            <a:r>
+              <a:rPr lang="ko-KR" altLang="en-US" dirty="0" smtClean="0"/>
+              <a:t>또는 </a:t>
+            </a:r>
+            <a:r>
+              <a:rPr lang="en-US" altLang="ko-KR" dirty="0" smtClean="0"/>
+              <a:t>‘test’ directory</a:t>
+            </a:r>
+            <a:r>
+              <a:rPr lang="ko-KR" altLang="en-US" dirty="0" smtClean="0"/>
+              <a:t>에 있는 </a:t>
+            </a:r>
+            <a:r>
+              <a:rPr lang="en-US" altLang="ko-KR" dirty="0" smtClean="0"/>
+              <a:t>project</a:t>
+            </a:r>
+            <a:r>
+              <a:rPr lang="ko-KR" altLang="en-US" dirty="0" smtClean="0"/>
+              <a:t>가 사용</a:t>
+            </a:r>
+            <a:endParaRPr lang="en-US" altLang="ko-KR" dirty="0" smtClean="0"/>
           </a:p>
           <a:p>
             <a:pPr lvl="1"/>
@@ -7777,7 +7865,6 @@
               <a:rPr lang="en-US" altLang="ko-KR" dirty="0" smtClean="0"/>
               <a:t>MRPT</a:t>
             </a:r>
-            <a:endParaRPr lang="en-US" altLang="ko-KR" dirty="0" smtClean="0"/>
           </a:p>
           <a:p>
             <a:r>

</xml_diff>